<commit_message>
Added final documentation for the project
</commit_message>
<xml_diff>
--- a/Presentation/Final Presentation.pptx
+++ b/Presentation/Final Presentation.pptx
@@ -186,7 +186,7 @@
 </file>
 
 <file path=ppt/charts/chart1.xml><?xml version="1.0" encoding="utf-8"?>
-<c:chartSpace xmlns:c="http://schemas.openxmlformats.org/drawingml/2006/chart" xmlns:a="http://schemas.openxmlformats.org/drawingml/2006/main" xmlns:r="http://schemas.openxmlformats.org/officeDocument/2006/relationships" xmlns:c16r2="http://schemas.microsoft.com/office/drawing/2015/06/chart">
+<c:chartSpace xmlns:c="http://schemas.openxmlformats.org/drawingml/2006/chart" xmlns:a="http://schemas.openxmlformats.org/drawingml/2006/main" xmlns:r="http://schemas.openxmlformats.org/officeDocument/2006/relationships">
   <c:date1904 val="0"/>
   <c:lang val="en-US"/>
   <c:roundedCorners val="1"/>
@@ -206,10 +206,10 @@
           <c:layoutTarget val="inner"/>
           <c:xMode val="edge"/>
           <c:yMode val="edge"/>
-          <c:x val="6.08618687632035E-2"/>
-          <c:y val="8.38566303763051E-2"/>
-          <c:w val="0.89230957808407996"/>
-          <c:h val="0.88779268730983296"/>
+          <c:x val="0.0608618687632035"/>
+          <c:y val="0.0838566303763051"/>
+          <c:w val="0.89230957808408"/>
+          <c:h val="0.887792687309833"/>
         </c:manualLayout>
       </c:layout>
       <c:barChart>
@@ -329,96 +329,96 @@
                 <c:formatCode>m/d/yyyy</c:formatCode>
                 <c:ptCount val="29"/>
                 <c:pt idx="0">
-                  <c:v>42975</c:v>
+                  <c:v>42975.0</c:v>
                 </c:pt>
                 <c:pt idx="1">
-                  <c:v>42975</c:v>
+                  <c:v>42975.0</c:v>
                 </c:pt>
                 <c:pt idx="2">
-                  <c:v>42988</c:v>
+                  <c:v>42988.0</c:v>
                 </c:pt>
                 <c:pt idx="3">
-                  <c:v>42989</c:v>
+                  <c:v>42989.0</c:v>
                 </c:pt>
                 <c:pt idx="4">
-                  <c:v>42995</c:v>
+                  <c:v>42995.0</c:v>
                 </c:pt>
                 <c:pt idx="5">
-                  <c:v>42996</c:v>
+                  <c:v>42996.0</c:v>
                 </c:pt>
                 <c:pt idx="6">
-                  <c:v>42998</c:v>
+                  <c:v>42998.0</c:v>
                 </c:pt>
                 <c:pt idx="7">
-                  <c:v>43003</c:v>
+                  <c:v>43003.0</c:v>
                 </c:pt>
                 <c:pt idx="8">
-                  <c:v>42988</c:v>
+                  <c:v>42988.0</c:v>
                 </c:pt>
                 <c:pt idx="9">
-                  <c:v>42995</c:v>
+                  <c:v>42995.0</c:v>
                 </c:pt>
                 <c:pt idx="10">
-                  <c:v>43004</c:v>
+                  <c:v>43004.0</c:v>
                 </c:pt>
                 <c:pt idx="11">
-                  <c:v>43009</c:v>
+                  <c:v>43009.0</c:v>
                 </c:pt>
                 <c:pt idx="12">
-                  <c:v>43011</c:v>
+                  <c:v>43011.0</c:v>
                 </c:pt>
                 <c:pt idx="13">
-                  <c:v>43014</c:v>
+                  <c:v>43014.0</c:v>
                 </c:pt>
                 <c:pt idx="14">
-                  <c:v>43018</c:v>
+                  <c:v>43018.0</c:v>
                 </c:pt>
                 <c:pt idx="15">
-                  <c:v>43023</c:v>
+                  <c:v>43023.0</c:v>
                 </c:pt>
                 <c:pt idx="16">
-                  <c:v>43031</c:v>
+                  <c:v>43031.0</c:v>
                 </c:pt>
                 <c:pt idx="17">
-                  <c:v>43023</c:v>
+                  <c:v>43023.0</c:v>
                 </c:pt>
                 <c:pt idx="18">
-                  <c:v>43026</c:v>
+                  <c:v>43026.0</c:v>
                 </c:pt>
                 <c:pt idx="19">
-                  <c:v>43035</c:v>
+                  <c:v>43035.0</c:v>
                 </c:pt>
                 <c:pt idx="20">
-                  <c:v>43023</c:v>
+                  <c:v>43023.0</c:v>
                 </c:pt>
                 <c:pt idx="21">
-                  <c:v>43031</c:v>
+                  <c:v>43031.0</c:v>
                 </c:pt>
                 <c:pt idx="22">
-                  <c:v>43037</c:v>
+                  <c:v>43037.0</c:v>
                 </c:pt>
                 <c:pt idx="23">
-                  <c:v>43038</c:v>
+                  <c:v>43038.0</c:v>
                 </c:pt>
                 <c:pt idx="24">
-                  <c:v>43039</c:v>
+                  <c:v>43039.0</c:v>
                 </c:pt>
                 <c:pt idx="25">
-                  <c:v>43051</c:v>
+                  <c:v>43051.0</c:v>
                 </c:pt>
                 <c:pt idx="26">
-                  <c:v>43055</c:v>
+                  <c:v>43055.0</c:v>
                 </c:pt>
                 <c:pt idx="27">
-                  <c:v>43058</c:v>
+                  <c:v>43058.0</c:v>
                 </c:pt>
                 <c:pt idx="28">
-                  <c:v>43052</c:v>
+                  <c:v>43052.0</c:v>
                 </c:pt>
               </c:numCache>
             </c:numRef>
           </c:val>
-          <c:extLst>
+          <c:extLst xmlns:c16r2="http://schemas.microsoft.com/office/drawing/2015/06/chart">
             <c:ext xmlns:c16="http://schemas.microsoft.com/office/drawing/2014/chart" uri="{C3380CC4-5D6E-409C-BE32-E72D297353CC}">
               <c16:uniqueId val="{00000000-5EA5-4B6F-8500-5DD02FB6FA79}"/>
             </c:ext>
@@ -450,7 +450,7 @@
               </a:ln>
               <a:effectLst/>
             </c:spPr>
-            <c:extLst>
+            <c:extLst xmlns:c16r2="http://schemas.microsoft.com/office/drawing/2015/06/chart">
               <c:ext xmlns:c16="http://schemas.microsoft.com/office/drawing/2014/chart" uri="{C3380CC4-5D6E-409C-BE32-E72D297353CC}">
                 <c16:uniqueId val="{00000002-5EA5-4B6F-8500-5DD02FB6FA79}"/>
               </c:ext>
@@ -469,7 +469,7 @@
               </a:ln>
               <a:effectLst/>
             </c:spPr>
-            <c:extLst>
+            <c:extLst xmlns:c16r2="http://schemas.microsoft.com/office/drawing/2015/06/chart">
               <c:ext xmlns:c16="http://schemas.microsoft.com/office/drawing/2014/chart" uri="{C3380CC4-5D6E-409C-BE32-E72D297353CC}">
                 <c16:uniqueId val="{00000004-5EA5-4B6F-8500-5DD02FB6FA79}"/>
               </c:ext>
@@ -488,7 +488,7 @@
               </a:ln>
               <a:effectLst/>
             </c:spPr>
-            <c:extLst>
+            <c:extLst xmlns:c16r2="http://schemas.microsoft.com/office/drawing/2015/06/chart">
               <c:ext xmlns:c16="http://schemas.microsoft.com/office/drawing/2014/chart" uri="{C3380CC4-5D6E-409C-BE32-E72D297353CC}">
                 <c16:uniqueId val="{00000006-5EA5-4B6F-8500-5DD02FB6FA79}"/>
               </c:ext>
@@ -507,7 +507,7 @@
               </a:ln>
               <a:effectLst/>
             </c:spPr>
-            <c:extLst>
+            <c:extLst xmlns:c16r2="http://schemas.microsoft.com/office/drawing/2015/06/chart">
               <c:ext xmlns:c16="http://schemas.microsoft.com/office/drawing/2014/chart" uri="{C3380CC4-5D6E-409C-BE32-E72D297353CC}">
                 <c16:uniqueId val="{00000008-5EA5-4B6F-8500-5DD02FB6FA79}"/>
               </c:ext>
@@ -526,7 +526,7 @@
               </a:ln>
               <a:effectLst/>
             </c:spPr>
-            <c:extLst>
+            <c:extLst xmlns:c16r2="http://schemas.microsoft.com/office/drawing/2015/06/chart">
               <c:ext xmlns:c16="http://schemas.microsoft.com/office/drawing/2014/chart" uri="{C3380CC4-5D6E-409C-BE32-E72D297353CC}">
                 <c16:uniqueId val="{0000000A-5EA5-4B6F-8500-5DD02FB6FA79}"/>
               </c:ext>
@@ -545,7 +545,7 @@
               </a:ln>
               <a:effectLst/>
             </c:spPr>
-            <c:extLst>
+            <c:extLst xmlns:c16r2="http://schemas.microsoft.com/office/drawing/2015/06/chart">
               <c:ext xmlns:c16="http://schemas.microsoft.com/office/drawing/2014/chart" uri="{C3380CC4-5D6E-409C-BE32-E72D297353CC}">
                 <c16:uniqueId val="{0000000C-5EA5-4B6F-8500-5DD02FB6FA79}"/>
               </c:ext>
@@ -564,7 +564,7 @@
               </a:ln>
               <a:effectLst/>
             </c:spPr>
-            <c:extLst>
+            <c:extLst xmlns:c16r2="http://schemas.microsoft.com/office/drawing/2015/06/chart">
               <c:ext xmlns:c16="http://schemas.microsoft.com/office/drawing/2014/chart" uri="{C3380CC4-5D6E-409C-BE32-E72D297353CC}">
                 <c16:uniqueId val="{0000000E-5EA5-4B6F-8500-5DD02FB6FA79}"/>
               </c:ext>
@@ -583,7 +583,7 @@
               </a:ln>
               <a:effectLst/>
             </c:spPr>
-            <c:extLst>
+            <c:extLst xmlns:c16r2="http://schemas.microsoft.com/office/drawing/2015/06/chart">
               <c:ext xmlns:c16="http://schemas.microsoft.com/office/drawing/2014/chart" uri="{C3380CC4-5D6E-409C-BE32-E72D297353CC}">
                 <c16:uniqueId val="{00000010-5EA5-4B6F-8500-5DD02FB6FA79}"/>
               </c:ext>
@@ -602,7 +602,7 @@
               </a:ln>
               <a:effectLst/>
             </c:spPr>
-            <c:extLst>
+            <c:extLst xmlns:c16r2="http://schemas.microsoft.com/office/drawing/2015/06/chart">
               <c:ext xmlns:c16="http://schemas.microsoft.com/office/drawing/2014/chart" uri="{C3380CC4-5D6E-409C-BE32-E72D297353CC}">
                 <c16:uniqueId val="{00000012-5EA5-4B6F-8500-5DD02FB6FA79}"/>
               </c:ext>
@@ -621,7 +621,7 @@
               </a:ln>
               <a:effectLst/>
             </c:spPr>
-            <c:extLst>
+            <c:extLst xmlns:c16r2="http://schemas.microsoft.com/office/drawing/2015/06/chart">
               <c:ext xmlns:c16="http://schemas.microsoft.com/office/drawing/2014/chart" uri="{C3380CC4-5D6E-409C-BE32-E72D297353CC}">
                 <c16:uniqueId val="{00000014-5EA5-4B6F-8500-5DD02FB6FA79}"/>
               </c:ext>
@@ -640,7 +640,7 @@
               </a:ln>
               <a:effectLst/>
             </c:spPr>
-            <c:extLst>
+            <c:extLst xmlns:c16r2="http://schemas.microsoft.com/office/drawing/2015/06/chart">
               <c:ext xmlns:c16="http://schemas.microsoft.com/office/drawing/2014/chart" uri="{C3380CC4-5D6E-409C-BE32-E72D297353CC}">
                 <c16:uniqueId val="{00000016-5EA5-4B6F-8500-5DD02FB6FA79}"/>
               </c:ext>
@@ -659,7 +659,7 @@
               </a:ln>
               <a:effectLst/>
             </c:spPr>
-            <c:extLst>
+            <c:extLst xmlns:c16r2="http://schemas.microsoft.com/office/drawing/2015/06/chart">
               <c:ext xmlns:c16="http://schemas.microsoft.com/office/drawing/2014/chart" uri="{C3380CC4-5D6E-409C-BE32-E72D297353CC}">
                 <c16:uniqueId val="{00000018-5EA5-4B6F-8500-5DD02FB6FA79}"/>
               </c:ext>
@@ -678,7 +678,7 @@
               </a:ln>
               <a:effectLst/>
             </c:spPr>
-            <c:extLst>
+            <c:extLst xmlns:c16r2="http://schemas.microsoft.com/office/drawing/2015/06/chart">
               <c:ext xmlns:c16="http://schemas.microsoft.com/office/drawing/2014/chart" uri="{C3380CC4-5D6E-409C-BE32-E72D297353CC}">
                 <c16:uniqueId val="{0000001A-5EA5-4B6F-8500-5DD02FB6FA79}"/>
               </c:ext>
@@ -697,7 +697,7 @@
               </a:ln>
               <a:effectLst/>
             </c:spPr>
-            <c:extLst>
+            <c:extLst xmlns:c16r2="http://schemas.microsoft.com/office/drawing/2015/06/chart">
               <c:ext xmlns:c16="http://schemas.microsoft.com/office/drawing/2014/chart" uri="{C3380CC4-5D6E-409C-BE32-E72D297353CC}">
                 <c16:uniqueId val="{0000001C-5EA5-4B6F-8500-5DD02FB6FA79}"/>
               </c:ext>
@@ -716,7 +716,7 @@
               </a:ln>
               <a:effectLst/>
             </c:spPr>
-            <c:extLst>
+            <c:extLst xmlns:c16r2="http://schemas.microsoft.com/office/drawing/2015/06/chart">
               <c:ext xmlns:c16="http://schemas.microsoft.com/office/drawing/2014/chart" uri="{C3380CC4-5D6E-409C-BE32-E72D297353CC}">
                 <c16:uniqueId val="{0000001E-5EA5-4B6F-8500-5DD02FB6FA79}"/>
               </c:ext>
@@ -735,7 +735,7 @@
               </a:ln>
               <a:effectLst/>
             </c:spPr>
-            <c:extLst>
+            <c:extLst xmlns:c16r2="http://schemas.microsoft.com/office/drawing/2015/06/chart">
               <c:ext xmlns:c16="http://schemas.microsoft.com/office/drawing/2014/chart" uri="{C3380CC4-5D6E-409C-BE32-E72D297353CC}">
                 <c16:uniqueId val="{00000020-5EA5-4B6F-8500-5DD02FB6FA79}"/>
               </c:ext>
@@ -754,7 +754,7 @@
               </a:ln>
               <a:effectLst/>
             </c:spPr>
-            <c:extLst>
+            <c:extLst xmlns:c16r2="http://schemas.microsoft.com/office/drawing/2015/06/chart">
               <c:ext xmlns:c16="http://schemas.microsoft.com/office/drawing/2014/chart" uri="{C3380CC4-5D6E-409C-BE32-E72D297353CC}">
                 <c16:uniqueId val="{00000022-5EA5-4B6F-8500-5DD02FB6FA79}"/>
               </c:ext>
@@ -773,7 +773,7 @@
               </a:ln>
               <a:effectLst/>
             </c:spPr>
-            <c:extLst>
+            <c:extLst xmlns:c16r2="http://schemas.microsoft.com/office/drawing/2015/06/chart">
               <c:ext xmlns:c16="http://schemas.microsoft.com/office/drawing/2014/chart" uri="{C3380CC4-5D6E-409C-BE32-E72D297353CC}">
                 <c16:uniqueId val="{00000024-5EA5-4B6F-8500-5DD02FB6FA79}"/>
               </c:ext>
@@ -792,7 +792,7 @@
               </a:ln>
               <a:effectLst/>
             </c:spPr>
-            <c:extLst>
+            <c:extLst xmlns:c16r2="http://schemas.microsoft.com/office/drawing/2015/06/chart">
               <c:ext xmlns:c16="http://schemas.microsoft.com/office/drawing/2014/chart" uri="{C3380CC4-5D6E-409C-BE32-E72D297353CC}">
                 <c16:uniqueId val="{00000026-5EA5-4B6F-8500-5DD02FB6FA79}"/>
               </c:ext>
@@ -811,7 +811,7 @@
               </a:ln>
               <a:effectLst/>
             </c:spPr>
-            <c:extLst>
+            <c:extLst xmlns:c16r2="http://schemas.microsoft.com/office/drawing/2015/06/chart">
               <c:ext xmlns:c16="http://schemas.microsoft.com/office/drawing/2014/chart" uri="{C3380CC4-5D6E-409C-BE32-E72D297353CC}">
                 <c16:uniqueId val="{00000028-5EA5-4B6F-8500-5DD02FB6FA79}"/>
               </c:ext>
@@ -830,7 +830,7 @@
               </a:ln>
               <a:effectLst/>
             </c:spPr>
-            <c:extLst>
+            <c:extLst xmlns:c16r2="http://schemas.microsoft.com/office/drawing/2015/06/chart">
               <c:ext xmlns:c16="http://schemas.microsoft.com/office/drawing/2014/chart" uri="{C3380CC4-5D6E-409C-BE32-E72D297353CC}">
                 <c16:uniqueId val="{0000002A-5EA5-4B6F-8500-5DD02FB6FA79}"/>
               </c:ext>
@@ -849,7 +849,7 @@
               </a:ln>
               <a:effectLst/>
             </c:spPr>
-            <c:extLst>
+            <c:extLst xmlns:c16r2="http://schemas.microsoft.com/office/drawing/2015/06/chart">
               <c:ext xmlns:c16="http://schemas.microsoft.com/office/drawing/2014/chart" uri="{C3380CC4-5D6E-409C-BE32-E72D297353CC}">
                 <c16:uniqueId val="{0000002C-5EA5-4B6F-8500-5DD02FB6FA79}"/>
               </c:ext>
@@ -868,7 +868,7 @@
               </a:ln>
               <a:effectLst/>
             </c:spPr>
-            <c:extLst>
+            <c:extLst xmlns:c16r2="http://schemas.microsoft.com/office/drawing/2015/06/chart">
               <c:ext xmlns:c16="http://schemas.microsoft.com/office/drawing/2014/chart" uri="{C3380CC4-5D6E-409C-BE32-E72D297353CC}">
                 <c16:uniqueId val="{0000002E-5EA5-4B6F-8500-5DD02FB6FA79}"/>
               </c:ext>
@@ -887,7 +887,7 @@
               </a:ln>
               <a:effectLst/>
             </c:spPr>
-            <c:extLst>
+            <c:extLst xmlns:c16r2="http://schemas.microsoft.com/office/drawing/2015/06/chart">
               <c:ext xmlns:c16="http://schemas.microsoft.com/office/drawing/2014/chart" uri="{C3380CC4-5D6E-409C-BE32-E72D297353CC}">
                 <c16:uniqueId val="{00000030-5EA5-4B6F-8500-5DD02FB6FA79}"/>
               </c:ext>
@@ -906,7 +906,7 @@
               </a:ln>
               <a:effectLst/>
             </c:spPr>
-            <c:extLst>
+            <c:extLst xmlns:c16r2="http://schemas.microsoft.com/office/drawing/2015/06/chart">
               <c:ext xmlns:c16="http://schemas.microsoft.com/office/drawing/2014/chart" uri="{C3380CC4-5D6E-409C-BE32-E72D297353CC}">
                 <c16:uniqueId val="{00000032-5EA5-4B6F-8500-5DD02FB6FA79}"/>
               </c:ext>
@@ -927,7 +927,7 @@
               </a:ln>
               <a:effectLst/>
             </c:spPr>
-            <c:extLst>
+            <c:extLst xmlns:c16r2="http://schemas.microsoft.com/office/drawing/2015/06/chart">
               <c:ext xmlns:c16="http://schemas.microsoft.com/office/drawing/2014/chart" uri="{C3380CC4-5D6E-409C-BE32-E72D297353CC}">
                 <c16:uniqueId val="{00000034-5EA5-4B6F-8500-5DD02FB6FA79}"/>
               </c:ext>
@@ -948,7 +948,7 @@
               </a:ln>
               <a:effectLst/>
             </c:spPr>
-            <c:extLst>
+            <c:extLst xmlns:c16r2="http://schemas.microsoft.com/office/drawing/2015/06/chart">
               <c:ext xmlns:c16="http://schemas.microsoft.com/office/drawing/2014/chart" uri="{C3380CC4-5D6E-409C-BE32-E72D297353CC}">
                 <c16:uniqueId val="{00000036-5EA5-4B6F-8500-5DD02FB6FA79}"/>
               </c:ext>
@@ -969,7 +969,7 @@
               </a:ln>
               <a:effectLst/>
             </c:spPr>
-            <c:extLst>
+            <c:extLst xmlns:c16r2="http://schemas.microsoft.com/office/drawing/2015/06/chart">
               <c:ext xmlns:c16="http://schemas.microsoft.com/office/drawing/2014/chart" uri="{C3380CC4-5D6E-409C-BE32-E72D297353CC}">
                 <c16:uniqueId val="{00000038-5EA5-4B6F-8500-5DD02FB6FA79}"/>
               </c:ext>
@@ -990,7 +990,7 @@
               </a:ln>
               <a:effectLst/>
             </c:spPr>
-            <c:extLst>
+            <c:extLst xmlns:c16r2="http://schemas.microsoft.com/office/drawing/2015/06/chart">
               <c:ext xmlns:c16="http://schemas.microsoft.com/office/drawing/2014/chart" uri="{C3380CC4-5D6E-409C-BE32-E72D297353CC}">
                 <c16:uniqueId val="{0000003A-5EA5-4B6F-8500-5DD02FB6FA79}"/>
               </c:ext>
@@ -1098,96 +1098,96 @@
                 <c:formatCode>0</c:formatCode>
                 <c:ptCount val="29"/>
                 <c:pt idx="0">
-                  <c:v>11</c:v>
+                  <c:v>11.0</c:v>
                 </c:pt>
                 <c:pt idx="1">
-                  <c:v>12</c:v>
+                  <c:v>12.0</c:v>
                 </c:pt>
                 <c:pt idx="2">
-                  <c:v>8</c:v>
+                  <c:v>8.0</c:v>
                 </c:pt>
                 <c:pt idx="3">
-                  <c:v>8</c:v>
+                  <c:v>8.0</c:v>
                 </c:pt>
                 <c:pt idx="4">
-                  <c:v>6</c:v>
+                  <c:v>6.0</c:v>
                 </c:pt>
                 <c:pt idx="5">
-                  <c:v>2</c:v>
+                  <c:v>2.0</c:v>
                 </c:pt>
                 <c:pt idx="6">
-                  <c:v>3</c:v>
+                  <c:v>3.0</c:v>
                 </c:pt>
                 <c:pt idx="7">
-                  <c:v>4</c:v>
+                  <c:v>4.0</c:v>
                 </c:pt>
                 <c:pt idx="8">
-                  <c:v>8</c:v>
+                  <c:v>8.0</c:v>
                 </c:pt>
                 <c:pt idx="9">
-                  <c:v>10</c:v>
+                  <c:v>10.0</c:v>
                 </c:pt>
                 <c:pt idx="10">
-                  <c:v>4</c:v>
+                  <c:v>4.0</c:v>
                 </c:pt>
                 <c:pt idx="11">
-                  <c:v>2</c:v>
+                  <c:v>2.0</c:v>
                 </c:pt>
                 <c:pt idx="12">
-                  <c:v>7</c:v>
+                  <c:v>7.0</c:v>
                 </c:pt>
                 <c:pt idx="13">
-                  <c:v>5</c:v>
+                  <c:v>5.0</c:v>
                 </c:pt>
                 <c:pt idx="14">
-                  <c:v>3</c:v>
+                  <c:v>3.0</c:v>
                 </c:pt>
                 <c:pt idx="15">
-                  <c:v>10</c:v>
+                  <c:v>10.0</c:v>
                 </c:pt>
                 <c:pt idx="16">
-                  <c:v>4</c:v>
+                  <c:v>4.0</c:v>
                 </c:pt>
                 <c:pt idx="17">
-                  <c:v>15</c:v>
+                  <c:v>15.0</c:v>
                 </c:pt>
                 <c:pt idx="18">
-                  <c:v>6</c:v>
+                  <c:v>6.0</c:v>
                 </c:pt>
                 <c:pt idx="19">
-                  <c:v>1</c:v>
+                  <c:v>1.0</c:v>
                 </c:pt>
                 <c:pt idx="20">
-                  <c:v>4</c:v>
+                  <c:v>4.0</c:v>
                 </c:pt>
                 <c:pt idx="21">
-                  <c:v>7</c:v>
+                  <c:v>7.0</c:v>
                 </c:pt>
                 <c:pt idx="22">
-                  <c:v>10</c:v>
+                  <c:v>10.0</c:v>
                 </c:pt>
                 <c:pt idx="23">
-                  <c:v>11</c:v>
+                  <c:v>11.0</c:v>
                 </c:pt>
                 <c:pt idx="24">
-                  <c:v>10</c:v>
+                  <c:v>10.0</c:v>
                 </c:pt>
                 <c:pt idx="25">
-                  <c:v>3</c:v>
+                  <c:v>3.0</c:v>
                 </c:pt>
                 <c:pt idx="26">
-                  <c:v>7</c:v>
+                  <c:v>7.0</c:v>
                 </c:pt>
                 <c:pt idx="27">
-                  <c:v>4</c:v>
+                  <c:v>4.0</c:v>
                 </c:pt>
                 <c:pt idx="28">
-                  <c:v>5</c:v>
+                  <c:v>5.0</c:v>
                 </c:pt>
               </c:numCache>
             </c:numRef>
           </c:val>
-          <c:extLst>
+          <c:extLst xmlns:c16r2="http://schemas.microsoft.com/office/drawing/2015/06/chart">
             <c:ext xmlns:c16="http://schemas.microsoft.com/office/drawing/2014/chart" uri="{C3380CC4-5D6E-409C-BE32-E72D297353CC}">
               <c16:uniqueId val="{0000003B-5EA5-4B6F-8500-5DD02FB6FA79}"/>
             </c:ext>
@@ -1203,11 +1203,11 @@
         </c:dLbls>
         <c:gapWidth val="150"/>
         <c:overlap val="100"/>
-        <c:axId val="367009312"/>
-        <c:axId val="367011088"/>
+        <c:axId val="-783575072"/>
+        <c:axId val="-783573296"/>
       </c:barChart>
       <c:catAx>
-        <c:axId val="367009312"/>
+        <c:axId val="-783575072"/>
         <c:scaling>
           <c:orientation val="maxMin"/>
         </c:scaling>
@@ -1250,7 +1250,7 @@
             <a:endParaRPr lang="en-US"/>
           </a:p>
         </c:txPr>
-        <c:crossAx val="367011088"/>
+        <c:crossAx val="-783573296"/>
         <c:crosses val="autoZero"/>
         <c:auto val="1"/>
         <c:lblAlgn val="ctr"/>
@@ -1258,11 +1258,11 @@
         <c:noMultiLvlLbl val="0"/>
       </c:catAx>
       <c:valAx>
-        <c:axId val="367011088"/>
+        <c:axId val="-783573296"/>
         <c:scaling>
           <c:orientation val="minMax"/>
-          <c:max val="43070"/>
-          <c:min val="42975"/>
+          <c:max val="43070.0"/>
+          <c:min val="42975.0"/>
         </c:scaling>
         <c:delete val="0"/>
         <c:axPos val="t"/>
@@ -1311,7 +1311,7 @@
             <a:endParaRPr lang="en-US"/>
           </a:p>
         </c:txPr>
-        <c:crossAx val="367009312"/>
+        <c:crossAx val="-783575072"/>
         <c:crosses val="autoZero"/>
         <c:crossBetween val="between"/>
       </c:valAx>
@@ -2014,7 +2014,7 @@
               <a:pPr>
                 <a:defRPr/>
               </a:pPr>
-              <a:t>12/1/2017</a:t>
+              <a:t>12/9/17</a:t>
             </a:fld>
             <a:endParaRPr lang="en-US"/>
           </a:p>
@@ -2219,7 +2219,7 @@
               <a:pPr>
                 <a:defRPr/>
               </a:pPr>
-              <a:t>12/1/2017</a:t>
+              <a:t>12/9/17</a:t>
             </a:fld>
             <a:endParaRPr lang="en-US"/>
           </a:p>
@@ -4466,7 +4466,7 @@
               <a:pPr>
                 <a:defRPr/>
               </a:pPr>
-              <a:t>12/1/2017</a:t>
+              <a:t>12/9/17</a:t>
             </a:fld>
             <a:endParaRPr lang="en-US"/>
           </a:p>
@@ -4571,7 +4571,7 @@
           </a:ln>
           <a:extLst>
             <a:ext uri="{91240B29-F687-4f45-9708-019B960494DF}">
-              <a14:hiddenLine xmlns:a14="http://schemas.microsoft.com/office/drawing/2010/main" xmlns="" w="9525">
+              <a14:hiddenLine xmlns="" xmlns:a14="http://schemas.microsoft.com/office/drawing/2010/main" w="9525">
                 <a:solidFill>
                   <a:srgbClr val="000000"/>
                 </a:solidFill>
@@ -4626,7 +4626,7 @@
           </a:ln>
           <a:extLst>
             <a:ext uri="{91240B29-F687-4f45-9708-019B960494DF}">
-              <a14:hiddenLine xmlns:a14="http://schemas.microsoft.com/office/drawing/2010/main" xmlns="" w="9525">
+              <a14:hiddenLine xmlns="" xmlns:a14="http://schemas.microsoft.com/office/drawing/2010/main" w="9525">
                 <a:solidFill>
                   <a:srgbClr val="000000"/>
                 </a:solidFill>
@@ -4887,7 +4887,7 @@
               <a:pPr>
                 <a:defRPr/>
               </a:pPr>
-              <a:t>12/1/2017</a:t>
+              <a:t>12/9/17</a:t>
             </a:fld>
             <a:endParaRPr lang="en-US"/>
           </a:p>
@@ -5140,7 +5140,7 @@
               <a:pPr>
                 <a:defRPr/>
               </a:pPr>
-              <a:t>12/1/2017</a:t>
+              <a:t>12/9/17</a:t>
             </a:fld>
             <a:endParaRPr lang="en-US"/>
           </a:p>
@@ -5685,7 +5685,7 @@
               <a:pPr>
                 <a:defRPr/>
               </a:pPr>
-              <a:t>12/1/2017</a:t>
+              <a:t>12/9/17</a:t>
             </a:fld>
             <a:endParaRPr lang="en-US"/>
           </a:p>
@@ -5938,7 +5938,7 @@
               <a:pPr>
                 <a:defRPr/>
               </a:pPr>
-              <a:t>12/1/2017</a:t>
+              <a:t>12/9/17</a:t>
             </a:fld>
             <a:endParaRPr lang="en-US"/>
           </a:p>
@@ -6475,7 +6475,7 @@
               <a:pPr>
                 <a:defRPr/>
               </a:pPr>
-              <a:t>12/1/2017</a:t>
+              <a:t>12/9/17</a:t>
             </a:fld>
             <a:endParaRPr lang="en-US"/>
           </a:p>
@@ -6777,7 +6777,7 @@
               <a:pPr>
                 <a:defRPr/>
               </a:pPr>
-              <a:t>12/1/2017</a:t>
+              <a:t>12/9/17</a:t>
             </a:fld>
             <a:endParaRPr lang="en-US"/>
           </a:p>
@@ -6956,7 +6956,7 @@
               <a:pPr>
                 <a:defRPr/>
               </a:pPr>
-              <a:t>12/1/2017</a:t>
+              <a:t>12/9/17</a:t>
             </a:fld>
             <a:endParaRPr lang="en-US"/>
           </a:p>
@@ -7141,7 +7141,7 @@
               <a:pPr>
                 <a:defRPr/>
               </a:pPr>
-              <a:t>12/1/2017</a:t>
+              <a:t>12/9/17</a:t>
             </a:fld>
             <a:endParaRPr lang="en-US"/>
           </a:p>
@@ -7336,7 +7336,7 @@
               <a:pPr>
                 <a:defRPr/>
               </a:pPr>
-              <a:t>12/1/2017</a:t>
+              <a:t>12/9/17</a:t>
             </a:fld>
             <a:endParaRPr lang="en-US"/>
           </a:p>
@@ -7597,7 +7597,7 @@
               <a:pPr>
                 <a:defRPr/>
               </a:pPr>
-              <a:t>12/1/2017</a:t>
+              <a:t>12/9/17</a:t>
             </a:fld>
             <a:endParaRPr lang="en-US"/>
           </a:p>
@@ -7909,7 +7909,7 @@
               <a:pPr>
                 <a:defRPr/>
               </a:pPr>
-              <a:t>12/1/2017</a:t>
+              <a:t>12/9/17</a:t>
             </a:fld>
             <a:endParaRPr lang="en-US"/>
           </a:p>
@@ -8361,7 +8361,7 @@
               <a:pPr>
                 <a:defRPr/>
               </a:pPr>
-              <a:t>12/1/2017</a:t>
+              <a:t>12/9/17</a:t>
             </a:fld>
             <a:endParaRPr lang="en-US"/>
           </a:p>
@@ -8489,7 +8489,7 @@
               <a:pPr>
                 <a:defRPr/>
               </a:pPr>
-              <a:t>12/1/2017</a:t>
+              <a:t>12/9/17</a:t>
             </a:fld>
             <a:endParaRPr lang="en-US"/>
           </a:p>
@@ -8589,7 +8589,7 @@
               <a:pPr>
                 <a:defRPr/>
               </a:pPr>
-              <a:t>12/1/2017</a:t>
+              <a:t>12/9/17</a:t>
             </a:fld>
             <a:endParaRPr lang="en-US"/>
           </a:p>
@@ -8882,7 +8882,7 @@
               <a:pPr>
                 <a:defRPr/>
               </a:pPr>
-              <a:t>12/1/2017</a:t>
+              <a:t>12/9/17</a:t>
             </a:fld>
             <a:endParaRPr lang="en-US"/>
           </a:p>
@@ -9183,7 +9183,7 @@
               <a:pPr>
                 <a:defRPr/>
               </a:pPr>
-              <a:t>12/1/2017</a:t>
+              <a:t>12/9/17</a:t>
             </a:fld>
             <a:endParaRPr lang="en-US"/>
           </a:p>
@@ -9714,7 +9714,7 @@
               <a:pPr>
                 <a:defRPr/>
               </a:pPr>
-              <a:t>12/1/2017</a:t>
+              <a:t>12/9/17</a:t>
             </a:fld>
             <a:endParaRPr lang="en-US"/>
           </a:p>
@@ -10288,6 +10288,12 @@
                 <a:ea typeface="ＭＳ Ｐゴシック" pitchFamily="34" charset="-128"/>
               </a:rPr>
             </a:br>
+            <a:r>
+              <a:rPr lang="en-US" altLang="en-US" sz="3200" dirty="0">
+                <a:ea typeface="ＭＳ Ｐゴシック" pitchFamily="34" charset="-128"/>
+              </a:rPr>
+              <a:t/>
+            </a:r>
             <a:br>
               <a:rPr lang="en-US" altLang="en-US" sz="3200" dirty="0">
                 <a:ea typeface="ＭＳ Ｐゴシック" pitchFamily="34" charset="-128"/>
@@ -10315,6 +10321,12 @@
                 <a:ea typeface="ＭＳ Ｐゴシック" pitchFamily="34" charset="-128"/>
               </a:rPr>
             </a:br>
+            <a:r>
+              <a:rPr lang="en-US" altLang="en-US" sz="1000" dirty="0">
+                <a:ea typeface="ＭＳ Ｐゴシック" pitchFamily="34" charset="-128"/>
+              </a:rPr>
+              <a:t/>
+            </a:r>
             <a:br>
               <a:rPr lang="en-US" altLang="en-US" sz="1000" dirty="0">
                 <a:ea typeface="ＭＳ Ｐゴシック" pitchFamily="34" charset="-128"/>
@@ -10326,6 +10338,12 @@
               </a:rPr>
               <a:t>Product Owners:</a:t>
             </a:r>
+            <a:r>
+              <a:rPr lang="en-US" altLang="en-US" sz="1800" dirty="0">
+                <a:ea typeface="ＭＳ Ｐゴシック" pitchFamily="34" charset="-128"/>
+              </a:rPr>
+              <a:t/>
+            </a:r>
             <a:br>
               <a:rPr lang="en-US" altLang="en-US" sz="1800" dirty="0">
                 <a:ea typeface="ＭＳ Ｐゴシック" pitchFamily="34" charset="-128"/>
@@ -10342,6 +10360,12 @@
                 <a:ea typeface="ＭＳ Ｐゴシック" pitchFamily="34" charset="-128"/>
               </a:rPr>
             </a:br>
+            <a:r>
+              <a:rPr lang="en-US" altLang="en-US" sz="1000" dirty="0">
+                <a:ea typeface="ＭＳ Ｐゴシック" pitchFamily="34" charset="-128"/>
+              </a:rPr>
+              <a:t/>
+            </a:r>
             <a:br>
               <a:rPr lang="en-US" altLang="en-US" sz="1000" dirty="0">
                 <a:ea typeface="ＭＳ Ｐゴシック" pitchFamily="34" charset="-128"/>
@@ -10353,6 +10377,12 @@
               </a:rPr>
               <a:t>Professor:</a:t>
             </a:r>
+            <a:r>
+              <a:rPr lang="en-US" altLang="en-US" sz="1800" dirty="0">
+                <a:ea typeface="ＭＳ Ｐゴシック" pitchFamily="34" charset="-128"/>
+              </a:rPr>
+              <a:t/>
+            </a:r>
             <a:br>
               <a:rPr lang="en-US" altLang="en-US" sz="1800" dirty="0">
                 <a:ea typeface="ＭＳ Ｐゴシック" pitchFamily="34" charset="-128"/>
@@ -10364,11 +10394,23 @@
               </a:rPr>
               <a:t> Masoud Sadjadi</a:t>
             </a:r>
+            <a:r>
+              <a:rPr lang="en-US" altLang="en-US" sz="2800" dirty="0">
+                <a:ea typeface="ＭＳ Ｐゴシック" pitchFamily="34" charset="-128"/>
+              </a:rPr>
+              <a:t/>
+            </a:r>
             <a:br>
               <a:rPr lang="en-US" altLang="en-US" sz="2800" dirty="0">
                 <a:ea typeface="ＭＳ Ｐゴシック" pitchFamily="34" charset="-128"/>
               </a:rPr>
             </a:br>
+            <a:r>
+              <a:rPr lang="en-US" altLang="en-US" sz="3600" dirty="0">
+                <a:ea typeface="ＭＳ Ｐゴシック" pitchFamily="34" charset="-128"/>
+              </a:rPr>
+              <a:t/>
+            </a:r>
             <a:br>
               <a:rPr lang="en-US" altLang="en-US" sz="3600" dirty="0">
                 <a:ea typeface="ＭＳ Ｐゴシック" pitchFamily="34" charset="-128"/>
@@ -10419,14 +10461,14 @@
           </a:ln>
           <a:extLst>
             <a:ext uri="{909E8E84-426E-40dd-AFC4-6F175D3DCCD1}">
-              <a14:hiddenFill xmlns:a14="http://schemas.microsoft.com/office/drawing/2010/main" xmlns="">
+              <a14:hiddenFill xmlns="" xmlns:a14="http://schemas.microsoft.com/office/drawing/2010/main">
                 <a:solidFill>
                   <a:srgbClr val="FFFFFF"/>
                 </a:solidFill>
               </a14:hiddenFill>
             </a:ext>
             <a:ext uri="{91240B29-F687-4f45-9708-019B960494DF}">
-              <a14:hiddenLine xmlns:a14="http://schemas.microsoft.com/office/drawing/2010/main" xmlns="" w="9525">
+              <a14:hiddenLine xmlns="" xmlns:a14="http://schemas.microsoft.com/office/drawing/2010/main" w="9525">
                 <a:solidFill>
                   <a:srgbClr val="000000"/>
                 </a:solidFill>
@@ -10597,6 +10639,12 @@
               </a:rPr>
               <a:t>Senior Project Final Presentation</a:t>
             </a:r>
+            <a:r>
+              <a:rPr lang="en-US" altLang="en-US" dirty="0">
+                <a:ea typeface="ＭＳ Ｐゴシック" pitchFamily="34" charset="-128"/>
+              </a:rPr>
+              <a:t/>
+            </a:r>
             <a:br>
               <a:rPr lang="en-US" altLang="en-US" dirty="0">
                 <a:ea typeface="ＭＳ Ｐゴシック" pitchFamily="34" charset="-128"/>
@@ -10725,7 +10773,7 @@
           <p:cNvPr id="2" name="Title 1">
             <a:extLst>
               <a:ext uri="{FF2B5EF4-FFF2-40B4-BE49-F238E27FC236}">
-                <a16:creationId xmlns:a16="http://schemas.microsoft.com/office/drawing/2014/main" id="{0A5D6A1D-A5DA-48A9-B28A-199074217068}"/>
+                <a16:creationId xmlns:a16="http://schemas.microsoft.com/office/drawing/2014/main" xmlns="" id="{0A5D6A1D-A5DA-48A9-B28A-199074217068}"/>
               </a:ext>
             </a:extLst>
           </p:cNvPr>
@@ -10753,7 +10801,7 @@
           <p:cNvPr id="3" name="Content Placeholder 2">
             <a:extLst>
               <a:ext uri="{FF2B5EF4-FFF2-40B4-BE49-F238E27FC236}">
-                <a16:creationId xmlns:a16="http://schemas.microsoft.com/office/drawing/2014/main" id="{5262B8F2-DD09-4F66-B885-75266DBA637E}"/>
+                <a16:creationId xmlns:a16="http://schemas.microsoft.com/office/drawing/2014/main" xmlns="" id="{5262B8F2-DD09-4F66-B885-75266DBA637E}"/>
               </a:ext>
             </a:extLst>
           </p:cNvPr>
@@ -10788,7 +10836,7 @@
           <p:cNvPr id="7" name="Picture 6">
             <a:extLst>
               <a:ext uri="{FF2B5EF4-FFF2-40B4-BE49-F238E27FC236}">
-                <a16:creationId xmlns:a16="http://schemas.microsoft.com/office/drawing/2014/main" id="{6C4593C4-D194-4B41-9F08-D5CA8C6CB7FD}"/>
+                <a16:creationId xmlns:a16="http://schemas.microsoft.com/office/drawing/2014/main" xmlns="" id="{6C4593C4-D194-4B41-9F08-D5CA8C6CB7FD}"/>
               </a:ext>
             </a:extLst>
           </p:cNvPr>
@@ -10852,7 +10900,7 @@
           <p:cNvPr id="2" name="Title 1">
             <a:extLst>
               <a:ext uri="{FF2B5EF4-FFF2-40B4-BE49-F238E27FC236}">
-                <a16:creationId xmlns:a16="http://schemas.microsoft.com/office/drawing/2014/main" id="{4CA11CFA-C78E-4670-B0C4-3F84380749F4}"/>
+                <a16:creationId xmlns:a16="http://schemas.microsoft.com/office/drawing/2014/main" xmlns="" id="{4CA11CFA-C78E-4670-B0C4-3F84380749F4}"/>
               </a:ext>
             </a:extLst>
           </p:cNvPr>
@@ -10880,7 +10928,7 @@
           <p:cNvPr id="3" name="Content Placeholder 2">
             <a:extLst>
               <a:ext uri="{FF2B5EF4-FFF2-40B4-BE49-F238E27FC236}">
-                <a16:creationId xmlns:a16="http://schemas.microsoft.com/office/drawing/2014/main" id="{1E1BDE71-F463-4157-A6B9-10F43881CDA6}"/>
+                <a16:creationId xmlns:a16="http://schemas.microsoft.com/office/drawing/2014/main" xmlns="" id="{1E1BDE71-F463-4157-A6B9-10F43881CDA6}"/>
               </a:ext>
             </a:extLst>
           </p:cNvPr>
@@ -10937,6 +10985,10 @@
             <a:r>
               <a:rPr lang="en-US" sz="2000" b="1" dirty="0"/>
               <a:t>Description &lt;Flow of events&gt;:</a:t>
+            </a:r>
+            <a:r>
+              <a:rPr lang="en-US" sz="2000" dirty="0"/>
+              <a:t/>
             </a:r>
             <a:br>
               <a:rPr lang="en-US" sz="2000" dirty="0"/>
@@ -11055,7 +11107,7 @@
           <p:cNvPr id="9" name="Picture 8">
             <a:extLst>
               <a:ext uri="{FF2B5EF4-FFF2-40B4-BE49-F238E27FC236}">
-                <a16:creationId xmlns:a16="http://schemas.microsoft.com/office/drawing/2014/main" id="{F9BE3471-828A-4BB3-803C-1DAD5A7A082D}"/>
+                <a16:creationId xmlns:a16="http://schemas.microsoft.com/office/drawing/2014/main" xmlns="" id="{F9BE3471-828A-4BB3-803C-1DAD5A7A082D}"/>
               </a:ext>
             </a:extLst>
           </p:cNvPr>
@@ -11137,7 +11189,7 @@
           <p:cNvPr id="4" name="image147.png">
             <a:extLst>
               <a:ext uri="{FF2B5EF4-FFF2-40B4-BE49-F238E27FC236}">
-                <a16:creationId xmlns:a16="http://schemas.microsoft.com/office/drawing/2014/main" id="{9F1ECD4B-80F3-4FAE-A01D-32F4366A2044}"/>
+                <a16:creationId xmlns:a16="http://schemas.microsoft.com/office/drawing/2014/main" xmlns="" id="{9F1ECD4B-80F3-4FAE-A01D-32F4366A2044}"/>
               </a:ext>
             </a:extLst>
           </p:cNvPr>
@@ -11170,7 +11222,7 @@
           <p:cNvPr id="5" name="TextBox 4">
             <a:extLst>
               <a:ext uri="{FF2B5EF4-FFF2-40B4-BE49-F238E27FC236}">
-                <a16:creationId xmlns:a16="http://schemas.microsoft.com/office/drawing/2014/main" id="{B3068F8D-4676-49D7-8961-14780A43B92B}"/>
+                <a16:creationId xmlns:a16="http://schemas.microsoft.com/office/drawing/2014/main" xmlns="" id="{B3068F8D-4676-49D7-8961-14780A43B92B}"/>
               </a:ext>
             </a:extLst>
           </p:cNvPr>
@@ -11258,7 +11310,7 @@
           <p:cNvPr id="13" name="Picture 12">
             <a:extLst>
               <a:ext uri="{FF2B5EF4-FFF2-40B4-BE49-F238E27FC236}">
-                <a16:creationId xmlns:a16="http://schemas.microsoft.com/office/drawing/2014/main" id="{F83F01DF-5F0A-415F-B67A-ECBB5CB38BD9}"/>
+                <a16:creationId xmlns:a16="http://schemas.microsoft.com/office/drawing/2014/main" xmlns="" id="{F83F01DF-5F0A-415F-B67A-ECBB5CB38BD9}"/>
               </a:ext>
             </a:extLst>
           </p:cNvPr>
@@ -11268,15 +11320,21 @@
           <p:nvPr/>
         </p:nvPicPr>
         <p:blipFill>
-          <a:blip r:embed="rId3"/>
+          <a:blip r:embed="rId3">
+            <a:extLst>
+              <a:ext uri="{28A0092B-C50C-407E-A947-70E740481C1C}">
+                <a14:useLocalDpi xmlns:a14="http://schemas.microsoft.com/office/drawing/2010/main" val="0"/>
+              </a:ext>
+            </a:extLst>
+          </a:blip>
           <a:stretch>
             <a:fillRect/>
           </a:stretch>
         </p:blipFill>
         <p:spPr>
           <a:xfrm>
-            <a:off x="568978" y="1905000"/>
-            <a:ext cx="8004456" cy="4264745"/>
+            <a:off x="757909" y="1905000"/>
+            <a:ext cx="7626593" cy="4264745"/>
           </a:xfrm>
           <a:prstGeom prst="rect">
             <a:avLst/>
@@ -11523,7 +11581,7 @@
           <p:cNvPr id="7" name="Content Placeholder 6">
             <a:extLst>
               <a:ext uri="{FF2B5EF4-FFF2-40B4-BE49-F238E27FC236}">
-                <a16:creationId xmlns:a16="http://schemas.microsoft.com/office/drawing/2014/main" id="{9277D322-8ECE-4223-BF5D-9F4D159B219B}"/>
+                <a16:creationId xmlns:a16="http://schemas.microsoft.com/office/drawing/2014/main" xmlns="" id="{9277D322-8ECE-4223-BF5D-9F4D159B219B}"/>
               </a:ext>
             </a:extLst>
           </p:cNvPr>
@@ -11582,7 +11640,7 @@
           <p:cNvPr id="2" name="Title 1">
             <a:extLst>
               <a:ext uri="{FF2B5EF4-FFF2-40B4-BE49-F238E27FC236}">
-                <a16:creationId xmlns:a16="http://schemas.microsoft.com/office/drawing/2014/main" id="{525123A0-6A8E-4DF9-AE26-B8CDA7FF3782}"/>
+                <a16:creationId xmlns:a16="http://schemas.microsoft.com/office/drawing/2014/main" xmlns="" id="{525123A0-6A8E-4DF9-AE26-B8CDA7FF3782}"/>
               </a:ext>
             </a:extLst>
           </p:cNvPr>
@@ -11610,7 +11668,7 @@
           <p:cNvPr id="5" name="Content Placeholder 4">
             <a:extLst>
               <a:ext uri="{FF2B5EF4-FFF2-40B4-BE49-F238E27FC236}">
-                <a16:creationId xmlns:a16="http://schemas.microsoft.com/office/drawing/2014/main" id="{21EB7ABB-67F4-49B5-ADE8-639BA79EE90B}"/>
+                <a16:creationId xmlns:a16="http://schemas.microsoft.com/office/drawing/2014/main" xmlns="" id="{21EB7ABB-67F4-49B5-ADE8-639BA79EE90B}"/>
               </a:ext>
             </a:extLst>
           </p:cNvPr>
@@ -11839,7 +11897,7 @@
           <p:cNvPr id="2" name="Title 1">
             <a:extLst>
               <a:ext uri="{FF2B5EF4-FFF2-40B4-BE49-F238E27FC236}">
-                <a16:creationId xmlns:a16="http://schemas.microsoft.com/office/drawing/2014/main" id="{957C9DF3-7F2D-4093-BD88-454343F73D04}"/>
+                <a16:creationId xmlns:a16="http://schemas.microsoft.com/office/drawing/2014/main" xmlns="" id="{957C9DF3-7F2D-4093-BD88-454343F73D04}"/>
               </a:ext>
             </a:extLst>
           </p:cNvPr>
@@ -11867,7 +11925,7 @@
           <p:cNvPr id="3" name="Content Placeholder 2">
             <a:extLst>
               <a:ext uri="{FF2B5EF4-FFF2-40B4-BE49-F238E27FC236}">
-                <a16:creationId xmlns:a16="http://schemas.microsoft.com/office/drawing/2014/main" id="{135EF749-0249-49A6-A901-F1A233BDB86E}"/>
+                <a16:creationId xmlns:a16="http://schemas.microsoft.com/office/drawing/2014/main" xmlns="" id="{135EF749-0249-49A6-A901-F1A233BDB86E}"/>
               </a:ext>
             </a:extLst>
           </p:cNvPr>
@@ -12062,7 +12120,7 @@
           <p:cNvPr id="2" name="Title 1">
             <a:extLst>
               <a:ext uri="{FF2B5EF4-FFF2-40B4-BE49-F238E27FC236}">
-                <a16:creationId xmlns:a16="http://schemas.microsoft.com/office/drawing/2014/main" id="{88236C65-5D23-49B5-9BBF-189BEEC091EF}"/>
+                <a16:creationId xmlns:a16="http://schemas.microsoft.com/office/drawing/2014/main" xmlns="" id="{88236C65-5D23-49B5-9BBF-189BEEC091EF}"/>
               </a:ext>
             </a:extLst>
           </p:cNvPr>
@@ -12090,7 +12148,7 @@
           <p:cNvPr id="3" name="Content Placeholder 2">
             <a:extLst>
               <a:ext uri="{FF2B5EF4-FFF2-40B4-BE49-F238E27FC236}">
-                <a16:creationId xmlns:a16="http://schemas.microsoft.com/office/drawing/2014/main" id="{EBCE0EF4-042F-4376-A490-F2EC0707776C}"/>
+                <a16:creationId xmlns:a16="http://schemas.microsoft.com/office/drawing/2014/main" xmlns="" id="{EBCE0EF4-042F-4376-A490-F2EC0707776C}"/>
               </a:ext>
             </a:extLst>
           </p:cNvPr>
@@ -12275,7 +12333,7 @@
           <p:cNvPr id="5" name="Picture 4">
             <a:extLst>
               <a:ext uri="{FF2B5EF4-FFF2-40B4-BE49-F238E27FC236}">
-                <a16:creationId xmlns:a16="http://schemas.microsoft.com/office/drawing/2014/main" id="{CA527E12-2311-47B2-ADD4-350AE9A894C7}"/>
+                <a16:creationId xmlns:a16="http://schemas.microsoft.com/office/drawing/2014/main" xmlns="" id="{CA527E12-2311-47B2-ADD4-350AE9A894C7}"/>
               </a:ext>
             </a:extLst>
           </p:cNvPr>
@@ -12311,7 +12369,7 @@
           <p:cNvPr id="9" name="Picture 8">
             <a:extLst>
               <a:ext uri="{FF2B5EF4-FFF2-40B4-BE49-F238E27FC236}">
-                <a16:creationId xmlns:a16="http://schemas.microsoft.com/office/drawing/2014/main" id="{CDC598FE-E04C-485C-B003-ACBB0AFF157E}"/>
+                <a16:creationId xmlns:a16="http://schemas.microsoft.com/office/drawing/2014/main" xmlns="" id="{CDC598FE-E04C-485C-B003-ACBB0AFF157E}"/>
               </a:ext>
             </a:extLst>
           </p:cNvPr>
@@ -12341,7 +12399,7 @@
           <p:cNvPr id="11" name="Picture 10">
             <a:extLst>
               <a:ext uri="{FF2B5EF4-FFF2-40B4-BE49-F238E27FC236}">
-                <a16:creationId xmlns:a16="http://schemas.microsoft.com/office/drawing/2014/main" id="{5CEA9EBB-DCF6-4890-9661-9033746BFD52}"/>
+                <a16:creationId xmlns:a16="http://schemas.microsoft.com/office/drawing/2014/main" xmlns="" id="{5CEA9EBB-DCF6-4890-9661-9033746BFD52}"/>
               </a:ext>
             </a:extLst>
           </p:cNvPr>
@@ -12371,7 +12429,7 @@
           <p:cNvPr id="13" name="Picture 12">
             <a:extLst>
               <a:ext uri="{FF2B5EF4-FFF2-40B4-BE49-F238E27FC236}">
-                <a16:creationId xmlns:a16="http://schemas.microsoft.com/office/drawing/2014/main" id="{54A62630-2CBB-4B37-905C-A1A7A9783851}"/>
+                <a16:creationId xmlns:a16="http://schemas.microsoft.com/office/drawing/2014/main" xmlns="" id="{54A62630-2CBB-4B37-905C-A1A7A9783851}"/>
               </a:ext>
             </a:extLst>
           </p:cNvPr>
@@ -12401,7 +12459,7 @@
           <p:cNvPr id="15" name="Picture 14">
             <a:extLst>
               <a:ext uri="{FF2B5EF4-FFF2-40B4-BE49-F238E27FC236}">
-                <a16:creationId xmlns:a16="http://schemas.microsoft.com/office/drawing/2014/main" id="{6F06A9F8-D2EF-4760-8406-9871676DE876}"/>
+                <a16:creationId xmlns:a16="http://schemas.microsoft.com/office/drawing/2014/main" xmlns="" id="{6F06A9F8-D2EF-4760-8406-9871676DE876}"/>
               </a:ext>
             </a:extLst>
           </p:cNvPr>
@@ -12431,7 +12489,7 @@
           <p:cNvPr id="19" name="Picture 18">
             <a:extLst>
               <a:ext uri="{FF2B5EF4-FFF2-40B4-BE49-F238E27FC236}">
-                <a16:creationId xmlns:a16="http://schemas.microsoft.com/office/drawing/2014/main" id="{3238302D-08AB-4494-A5F3-CC039277A494}"/>
+                <a16:creationId xmlns:a16="http://schemas.microsoft.com/office/drawing/2014/main" xmlns="" id="{3238302D-08AB-4494-A5F3-CC039277A494}"/>
               </a:ext>
             </a:extLst>
           </p:cNvPr>
@@ -12461,7 +12519,7 @@
           <p:cNvPr id="21" name="Graphic 20">
             <a:extLst>
               <a:ext uri="{FF2B5EF4-FFF2-40B4-BE49-F238E27FC236}">
-                <a16:creationId xmlns:a16="http://schemas.microsoft.com/office/drawing/2014/main" id="{32349851-161A-4C1A-8A7B-E0C28A586173}"/>
+                <a16:creationId xmlns:a16="http://schemas.microsoft.com/office/drawing/2014/main" xmlns="" id="{32349851-161A-4C1A-8A7B-E0C28A586173}"/>
               </a:ext>
             </a:extLst>
           </p:cNvPr>
@@ -12474,7 +12532,7 @@
           <a:blip r:embed="rId9">
             <a:extLst>
               <a:ext uri="{96DAC541-7B7A-43D3-8B79-37D633B846F1}">
-                <asvg:svgBlip xmlns:asvg="http://schemas.microsoft.com/office/drawing/2016/SVG/main" r:embed="rId10"/>
+                <asvg:svgBlip xmlns:asvg="http://schemas.microsoft.com/office/drawing/2016/SVG/main" xmlns="" r:embed="rId10"/>
               </a:ext>
             </a:extLst>
           </a:blip>
@@ -12497,7 +12555,7 @@
           <p:cNvPr id="25" name="Graphic 24">
             <a:extLst>
               <a:ext uri="{FF2B5EF4-FFF2-40B4-BE49-F238E27FC236}">
-                <a16:creationId xmlns:a16="http://schemas.microsoft.com/office/drawing/2014/main" id="{8F18CDFF-F796-4E10-8AF8-B4D8EF7EB6DF}"/>
+                <a16:creationId xmlns:a16="http://schemas.microsoft.com/office/drawing/2014/main" xmlns="" id="{8F18CDFF-F796-4E10-8AF8-B4D8EF7EB6DF}"/>
               </a:ext>
             </a:extLst>
           </p:cNvPr>
@@ -12510,7 +12568,7 @@
           <a:blip r:embed="rId11">
             <a:extLst>
               <a:ext uri="{96DAC541-7B7A-43D3-8B79-37D633B846F1}">
-                <asvg:svgBlip xmlns:asvg="http://schemas.microsoft.com/office/drawing/2016/SVG/main" r:embed="rId12"/>
+                <asvg:svgBlip xmlns:asvg="http://schemas.microsoft.com/office/drawing/2016/SVG/main" xmlns="" r:embed="rId12"/>
               </a:ext>
             </a:extLst>
           </a:blip>
@@ -12533,7 +12591,7 @@
           <p:cNvPr id="27" name="Graphic 26">
             <a:extLst>
               <a:ext uri="{FF2B5EF4-FFF2-40B4-BE49-F238E27FC236}">
-                <a16:creationId xmlns:a16="http://schemas.microsoft.com/office/drawing/2014/main" id="{42CBEED3-C991-45BA-A568-3FDC449F45CA}"/>
+                <a16:creationId xmlns:a16="http://schemas.microsoft.com/office/drawing/2014/main" xmlns="" id="{42CBEED3-C991-45BA-A568-3FDC449F45CA}"/>
               </a:ext>
             </a:extLst>
           </p:cNvPr>
@@ -12546,7 +12604,7 @@
           <a:blip r:embed="rId13">
             <a:extLst>
               <a:ext uri="{96DAC541-7B7A-43D3-8B79-37D633B846F1}">
-                <asvg:svgBlip xmlns:asvg="http://schemas.microsoft.com/office/drawing/2016/SVG/main" r:embed="rId14"/>
+                <asvg:svgBlip xmlns:asvg="http://schemas.microsoft.com/office/drawing/2016/SVG/main" xmlns="" r:embed="rId14"/>
               </a:ext>
             </a:extLst>
           </a:blip>
@@ -12599,7 +12657,7 @@
           <p:cNvPr id="2" name="Title 1">
             <a:extLst>
               <a:ext uri="{FF2B5EF4-FFF2-40B4-BE49-F238E27FC236}">
-                <a16:creationId xmlns:a16="http://schemas.microsoft.com/office/drawing/2014/main" id="{3E0E5AC7-238A-4E56-882C-FA09CD5A85A5}"/>
+                <a16:creationId xmlns:a16="http://schemas.microsoft.com/office/drawing/2014/main" xmlns="" id="{3E0E5AC7-238A-4E56-882C-FA09CD5A85A5}"/>
               </a:ext>
             </a:extLst>
           </p:cNvPr>
@@ -12630,7 +12688,7 @@
           <p:cNvPr id="8" name="TextBox 7">
             <a:extLst>
               <a:ext uri="{FF2B5EF4-FFF2-40B4-BE49-F238E27FC236}">
-                <a16:creationId xmlns:a16="http://schemas.microsoft.com/office/drawing/2014/main" id="{21116190-D926-4A18-BBBF-78369F737B1F}"/>
+                <a16:creationId xmlns:a16="http://schemas.microsoft.com/office/drawing/2014/main" xmlns="" id="{21116190-D926-4A18-BBBF-78369F737B1F}"/>
               </a:ext>
             </a:extLst>
           </p:cNvPr>
@@ -12676,7 +12734,7 @@
           <p:cNvPr id="10" name="Picture 9">
             <a:extLst>
               <a:ext uri="{FF2B5EF4-FFF2-40B4-BE49-F238E27FC236}">
-                <a16:creationId xmlns:a16="http://schemas.microsoft.com/office/drawing/2014/main" id="{BB3B1348-FD6F-43E3-BF37-0AD03C9E3906}"/>
+                <a16:creationId xmlns:a16="http://schemas.microsoft.com/office/drawing/2014/main" xmlns="" id="{BB3B1348-FD6F-43E3-BF37-0AD03C9E3906}"/>
               </a:ext>
             </a:extLst>
           </p:cNvPr>
@@ -12741,7 +12799,7 @@
           <p:cNvPr id="2" name="Title 1">
             <a:extLst>
               <a:ext uri="{FF2B5EF4-FFF2-40B4-BE49-F238E27FC236}">
-                <a16:creationId xmlns:a16="http://schemas.microsoft.com/office/drawing/2014/main" id="{B292DB9E-65B8-45AF-B152-05A2D469DFF8}"/>
+                <a16:creationId xmlns:a16="http://schemas.microsoft.com/office/drawing/2014/main" xmlns="" id="{B292DB9E-65B8-45AF-B152-05A2D469DFF8}"/>
               </a:ext>
             </a:extLst>
           </p:cNvPr>
@@ -12773,7 +12831,7 @@
           <p:cNvPr id="3" name="Content Placeholder 2">
             <a:extLst>
               <a:ext uri="{FF2B5EF4-FFF2-40B4-BE49-F238E27FC236}">
-                <a16:creationId xmlns:a16="http://schemas.microsoft.com/office/drawing/2014/main" id="{C45A2704-A999-4A83-8B09-71C7FDE55F93}"/>
+                <a16:creationId xmlns:a16="http://schemas.microsoft.com/office/drawing/2014/main" xmlns="" id="{C45A2704-A999-4A83-8B09-71C7FDE55F93}"/>
               </a:ext>
             </a:extLst>
           </p:cNvPr>
@@ -12812,7 +12870,7 @@
           <p:cNvPr id="5" name="Picture 4">
             <a:extLst>
               <a:ext uri="{FF2B5EF4-FFF2-40B4-BE49-F238E27FC236}">
-                <a16:creationId xmlns:a16="http://schemas.microsoft.com/office/drawing/2014/main" id="{836DF217-66C7-4E74-88EB-DC9B83C6D895}"/>
+                <a16:creationId xmlns:a16="http://schemas.microsoft.com/office/drawing/2014/main" xmlns="" id="{836DF217-66C7-4E74-88EB-DC9B83C6D895}"/>
               </a:ext>
             </a:extLst>
           </p:cNvPr>
@@ -12847,7 +12905,7 @@
           <p:cNvPr id="7" name="Picture 6">
             <a:extLst>
               <a:ext uri="{FF2B5EF4-FFF2-40B4-BE49-F238E27FC236}">
-                <a16:creationId xmlns:a16="http://schemas.microsoft.com/office/drawing/2014/main" id="{52D00135-C58D-4E0C-B702-F2A4B2DD7886}"/>
+                <a16:creationId xmlns:a16="http://schemas.microsoft.com/office/drawing/2014/main" xmlns="" id="{52D00135-C58D-4E0C-B702-F2A4B2DD7886}"/>
               </a:ext>
             </a:extLst>
           </p:cNvPr>
@@ -12912,7 +12970,7 @@
           <p:cNvPr id="2" name="Title 1">
             <a:extLst>
               <a:ext uri="{FF2B5EF4-FFF2-40B4-BE49-F238E27FC236}">
-                <a16:creationId xmlns:a16="http://schemas.microsoft.com/office/drawing/2014/main" id="{68827FDD-0C7A-4915-979D-37AE32218891}"/>
+                <a16:creationId xmlns:a16="http://schemas.microsoft.com/office/drawing/2014/main" xmlns="" id="{68827FDD-0C7A-4915-979D-37AE32218891}"/>
               </a:ext>
             </a:extLst>
           </p:cNvPr>
@@ -12943,7 +13001,7 @@
           <p:cNvPr id="5" name="Content Placeholder 4">
             <a:extLst>
               <a:ext uri="{FF2B5EF4-FFF2-40B4-BE49-F238E27FC236}">
-                <a16:creationId xmlns:a16="http://schemas.microsoft.com/office/drawing/2014/main" id="{4D578D11-8648-4FCA-95C5-0EFC1CDF881A}"/>
+                <a16:creationId xmlns:a16="http://schemas.microsoft.com/office/drawing/2014/main" xmlns="" id="{4D578D11-8648-4FCA-95C5-0EFC1CDF881A}"/>
               </a:ext>
             </a:extLst>
           </p:cNvPr>
@@ -12977,7 +13035,7 @@
           <p:cNvPr id="7" name="Picture 6">
             <a:extLst>
               <a:ext uri="{FF2B5EF4-FFF2-40B4-BE49-F238E27FC236}">
-                <a16:creationId xmlns:a16="http://schemas.microsoft.com/office/drawing/2014/main" id="{350E473C-AA1F-4E0C-ABEA-0EE48A2FE5A8}"/>
+                <a16:creationId xmlns:a16="http://schemas.microsoft.com/office/drawing/2014/main" xmlns="" id="{350E473C-AA1F-4E0C-ABEA-0EE48A2FE5A8}"/>
               </a:ext>
             </a:extLst>
           </p:cNvPr>
@@ -13012,7 +13070,7 @@
           <p:cNvPr id="8" name="TextBox 7">
             <a:extLst>
               <a:ext uri="{FF2B5EF4-FFF2-40B4-BE49-F238E27FC236}">
-                <a16:creationId xmlns:a16="http://schemas.microsoft.com/office/drawing/2014/main" id="{1846088F-3556-41BA-A36A-60859377F3C8}"/>
+                <a16:creationId xmlns:a16="http://schemas.microsoft.com/office/drawing/2014/main" xmlns="" id="{1846088F-3556-41BA-A36A-60859377F3C8}"/>
               </a:ext>
             </a:extLst>
           </p:cNvPr>
@@ -13068,7 +13126,7 @@
           <p:cNvPr id="9" name="TextBox 8">
             <a:extLst>
               <a:ext uri="{FF2B5EF4-FFF2-40B4-BE49-F238E27FC236}">
-                <a16:creationId xmlns:a16="http://schemas.microsoft.com/office/drawing/2014/main" id="{DDE70182-416B-4692-9288-29745122A8F7}"/>
+                <a16:creationId xmlns:a16="http://schemas.microsoft.com/office/drawing/2014/main" xmlns="" id="{DDE70182-416B-4692-9288-29745122A8F7}"/>
               </a:ext>
             </a:extLst>
           </p:cNvPr>
@@ -13137,7 +13195,7 @@
           <p:cNvPr id="2" name="Title 1">
             <a:extLst>
               <a:ext uri="{FF2B5EF4-FFF2-40B4-BE49-F238E27FC236}">
-                <a16:creationId xmlns:a16="http://schemas.microsoft.com/office/drawing/2014/main" id="{CB80585C-20C7-4F69-98AD-563EFB2A92F8}"/>
+                <a16:creationId xmlns:a16="http://schemas.microsoft.com/office/drawing/2014/main" xmlns="" id="{CB80585C-20C7-4F69-98AD-563EFB2A92F8}"/>
               </a:ext>
             </a:extLst>
           </p:cNvPr>
@@ -13168,7 +13226,7 @@
           <p:cNvPr id="3" name="Content Placeholder 2">
             <a:extLst>
               <a:ext uri="{FF2B5EF4-FFF2-40B4-BE49-F238E27FC236}">
-                <a16:creationId xmlns:a16="http://schemas.microsoft.com/office/drawing/2014/main" id="{D5BA3FD3-5399-44D3-8D89-F5681946C607}"/>
+                <a16:creationId xmlns:a16="http://schemas.microsoft.com/office/drawing/2014/main" xmlns="" id="{D5BA3FD3-5399-44D3-8D89-F5681946C607}"/>
               </a:ext>
             </a:extLst>
           </p:cNvPr>
@@ -13203,7 +13261,7 @@
           <p:cNvPr id="5" name="Picture 4">
             <a:extLst>
               <a:ext uri="{FF2B5EF4-FFF2-40B4-BE49-F238E27FC236}">
-                <a16:creationId xmlns:a16="http://schemas.microsoft.com/office/drawing/2014/main" id="{A73B063D-1A71-44AD-AF51-7BA19A0C41B4}"/>
+                <a16:creationId xmlns:a16="http://schemas.microsoft.com/office/drawing/2014/main" xmlns="" id="{A73B063D-1A71-44AD-AF51-7BA19A0C41B4}"/>
               </a:ext>
             </a:extLst>
           </p:cNvPr>
@@ -13233,7 +13291,7 @@
           <p:cNvPr id="7" name="Picture 6">
             <a:extLst>
               <a:ext uri="{FF2B5EF4-FFF2-40B4-BE49-F238E27FC236}">
-                <a16:creationId xmlns:a16="http://schemas.microsoft.com/office/drawing/2014/main" id="{42C772CA-8D21-4AE4-B387-B4ABE5483FC2}"/>
+                <a16:creationId xmlns:a16="http://schemas.microsoft.com/office/drawing/2014/main" xmlns="" id="{42C772CA-8D21-4AE4-B387-B4ABE5483FC2}"/>
               </a:ext>
             </a:extLst>
           </p:cNvPr>
@@ -13315,7 +13373,7 @@
           <p:cNvPr id="5" name="Chart 4">
             <a:extLst>
               <a:ext uri="{FF2B5EF4-FFF2-40B4-BE49-F238E27FC236}">
-                <a16:creationId xmlns:a16="http://schemas.microsoft.com/office/drawing/2014/main" id="{00000000-0008-0000-0000-00000E000000}"/>
+                <a16:creationId xmlns:a16="http://schemas.microsoft.com/office/drawing/2014/main" xmlns="" id="{00000000-0008-0000-0000-00000E000000}"/>
               </a:ext>
             </a:extLst>
           </p:cNvPr>
@@ -13397,7 +13455,7 @@
           <p:cNvPr id="4" name="Content Placeholder 3">
             <a:extLst>
               <a:ext uri="{FF2B5EF4-FFF2-40B4-BE49-F238E27FC236}">
-                <a16:creationId xmlns:a16="http://schemas.microsoft.com/office/drawing/2014/main" id="{3981780B-8655-4A79-A2ED-74A6EFC344D6}"/>
+                <a16:creationId xmlns:a16="http://schemas.microsoft.com/office/drawing/2014/main" xmlns="" id="{3981780B-8655-4A79-A2ED-74A6EFC344D6}"/>
               </a:ext>
             </a:extLst>
           </p:cNvPr>
@@ -13469,7 +13527,7 @@
           <p:cNvPr id="5" name="Content Placeholder 4">
             <a:extLst>
               <a:ext uri="{FF2B5EF4-FFF2-40B4-BE49-F238E27FC236}">
-                <a16:creationId xmlns:a16="http://schemas.microsoft.com/office/drawing/2014/main" id="{31530E08-5083-4ADE-A047-2EA8DFD18306}"/>
+                <a16:creationId xmlns:a16="http://schemas.microsoft.com/office/drawing/2014/main" xmlns="" id="{31530E08-5083-4ADE-A047-2EA8DFD18306}"/>
               </a:ext>
             </a:extLst>
           </p:cNvPr>
@@ -13568,7 +13626,7 @@
           <p:cNvPr id="2" name="Title 1">
             <a:extLst>
               <a:ext uri="{FF2B5EF4-FFF2-40B4-BE49-F238E27FC236}">
-                <a16:creationId xmlns:a16="http://schemas.microsoft.com/office/drawing/2014/main" id="{504B6A8A-1306-451B-A388-008F7C6F3A2D}"/>
+                <a16:creationId xmlns:a16="http://schemas.microsoft.com/office/drawing/2014/main" xmlns="" id="{504B6A8A-1306-451B-A388-008F7C6F3A2D}"/>
               </a:ext>
             </a:extLst>
           </p:cNvPr>
@@ -13596,7 +13654,7 @@
           <p:cNvPr id="3" name="Content Placeholder 2">
             <a:extLst>
               <a:ext uri="{FF2B5EF4-FFF2-40B4-BE49-F238E27FC236}">
-                <a16:creationId xmlns:a16="http://schemas.microsoft.com/office/drawing/2014/main" id="{7905CE1B-D1D2-4239-978F-7A9E554F16AB}"/>
+                <a16:creationId xmlns:a16="http://schemas.microsoft.com/office/drawing/2014/main" xmlns="" id="{7905CE1B-D1D2-4239-978F-7A9E554F16AB}"/>
               </a:ext>
             </a:extLst>
           </p:cNvPr>
@@ -13670,7 +13728,7 @@
           <p:cNvPr id="4" name="Content Placeholder 3">
             <a:extLst>
               <a:ext uri="{FF2B5EF4-FFF2-40B4-BE49-F238E27FC236}">
-                <a16:creationId xmlns:a16="http://schemas.microsoft.com/office/drawing/2014/main" id="{3A71F57A-5543-44CD-A16D-1902DFEEF0C6}"/>
+                <a16:creationId xmlns:a16="http://schemas.microsoft.com/office/drawing/2014/main" xmlns="" id="{3A71F57A-5543-44CD-A16D-1902DFEEF0C6}"/>
               </a:ext>
             </a:extLst>
           </p:cNvPr>

</xml_diff>